<commit_message>
added cacheDecorator task7 JS_E
</commit_message>
<xml_diff>
--- a/Presentation/Symbol type.pptx
+++ b/Presentation/Symbol type.pptx
@@ -419,7 +419,7 @@
           <a:p>
             <a:fld id="{A66BC902-23BB-4858-9DD5-E04F8B608DC6}" type="datetimeFigureOut">
               <a:rPr lang="ru-RU" smtClean="0"/>
-              <a:t>02.08.2021</a:t>
+              <a:t>03.08.2021</a:t>
             </a:fld>
             <a:endParaRPr lang="ru-RU"/>
           </a:p>
@@ -584,7 +584,7 @@
           <a:p>
             <a:fld id="{A66BC902-23BB-4858-9DD5-E04F8B608DC6}" type="datetimeFigureOut">
               <a:rPr lang="ru-RU" smtClean="0"/>
-              <a:t>02.08.2021</a:t>
+              <a:t>03.08.2021</a:t>
             </a:fld>
             <a:endParaRPr lang="ru-RU"/>
           </a:p>
@@ -759,7 +759,7 @@
           <a:p>
             <a:fld id="{A66BC902-23BB-4858-9DD5-E04F8B608DC6}" type="datetimeFigureOut">
               <a:rPr lang="ru-RU" smtClean="0"/>
-              <a:t>02.08.2021</a:t>
+              <a:t>03.08.2021</a:t>
             </a:fld>
             <a:endParaRPr lang="ru-RU"/>
           </a:p>
@@ -906,7 +906,7 @@
           <a:p>
             <a:fld id="{A66BC902-23BB-4858-9DD5-E04F8B608DC6}" type="datetimeFigureOut">
               <a:rPr lang="ru-RU" smtClean="0"/>
-              <a:t>02.08.2021</a:t>
+              <a:t>03.08.2021</a:t>
             </a:fld>
             <a:endParaRPr lang="ru-RU"/>
           </a:p>
@@ -1023,7 +1023,7 @@
           <a:p>
             <a:fld id="{A66BC902-23BB-4858-9DD5-E04F8B608DC6}" type="datetimeFigureOut">
               <a:rPr lang="ru-RU" smtClean="0"/>
-              <a:t>02.08.2021</a:t>
+              <a:t>03.08.2021</a:t>
             </a:fld>
             <a:endParaRPr lang="ru-RU"/>
           </a:p>
@@ -1293,7 +1293,7 @@
           <a:p>
             <a:fld id="{A66BC902-23BB-4858-9DD5-E04F8B608DC6}" type="datetimeFigureOut">
               <a:rPr lang="ru-RU" smtClean="0"/>
-              <a:t>02.08.2021</a:t>
+              <a:t>03.08.2021</a:t>
             </a:fld>
             <a:endParaRPr lang="ru-RU"/>
           </a:p>
@@ -1562,7 +1562,7 @@
           <a:p>
             <a:fld id="{A66BC902-23BB-4858-9DD5-E04F8B608DC6}" type="datetimeFigureOut">
               <a:rPr lang="ru-RU" smtClean="0"/>
-              <a:t>02.08.2021</a:t>
+              <a:t>03.08.2021</a:t>
             </a:fld>
             <a:endParaRPr lang="ru-RU"/>
           </a:p>
@@ -2009,7 +2009,7 @@
           <a:p>
             <a:fld id="{A66BC902-23BB-4858-9DD5-E04F8B608DC6}" type="datetimeFigureOut">
               <a:rPr lang="ru-RU" smtClean="0"/>
-              <a:t>02.08.2021</a:t>
+              <a:t>03.08.2021</a:t>
             </a:fld>
             <a:endParaRPr lang="ru-RU"/>
           </a:p>
@@ -2122,7 +2122,7 @@
           <a:p>
             <a:fld id="{A66BC902-23BB-4858-9DD5-E04F8B608DC6}" type="datetimeFigureOut">
               <a:rPr lang="ru-RU" smtClean="0"/>
-              <a:t>02.08.2021</a:t>
+              <a:t>03.08.2021</a:t>
             </a:fld>
             <a:endParaRPr lang="ru-RU"/>
           </a:p>
@@ -2372,7 +2372,7 @@
           <a:p>
             <a:fld id="{A66BC902-23BB-4858-9DD5-E04F8B608DC6}" type="datetimeFigureOut">
               <a:rPr lang="ru-RU" smtClean="0"/>
-              <a:t>02.08.2021</a:t>
+              <a:t>03.08.2021</a:t>
             </a:fld>
             <a:endParaRPr lang="ru-RU"/>
           </a:p>
@@ -2612,7 +2612,7 @@
           <a:p>
             <a:fld id="{A66BC902-23BB-4858-9DD5-E04F8B608DC6}" type="datetimeFigureOut">
               <a:rPr lang="ru-RU" smtClean="0"/>
-              <a:t>02.08.2021</a:t>
+              <a:t>03.08.2021</a:t>
             </a:fld>
             <a:endParaRPr lang="ru-RU"/>
           </a:p>
@@ -2785,7 +2785,7 @@
           <a:p>
             <a:fld id="{A66BC902-23BB-4858-9DD5-E04F8B608DC6}" type="datetimeFigureOut">
               <a:rPr lang="ru-RU" smtClean="0"/>
-              <a:t>02.08.2021</a:t>
+              <a:t>03.08.2021</a:t>
             </a:fld>
             <a:endParaRPr lang="ru-RU"/>
           </a:p>
@@ -4973,11 +4973,7 @@
             </a:r>
             <a:r>
               <a:rPr lang="ru-RU" dirty="0" smtClean="0"/>
-              <a:t> </a:t>
-            </a:r>
-            <a:r>
-              <a:rPr lang="ru-RU" dirty="0" smtClean="0"/>
-              <a:t>свойства</a:t>
+              <a:t> свойства</a:t>
             </a:r>
             <a:endParaRPr lang="en-US" dirty="0" smtClean="0"/>
           </a:p>
@@ -5051,7 +5047,6 @@
               <a:rPr lang="ru-RU" dirty="0" smtClean="0"/>
               <a:t>символы</a:t>
             </a:r>
-            <a:endParaRPr lang="ru-RU" dirty="0" smtClean="0"/>
           </a:p>
           <a:p>
             <a:pPr marL="457200" indent="-457200">
@@ -5061,7 +5056,6 @@
               <a:rPr lang="en-US" dirty="0" smtClean="0"/>
               <a:t>Summary</a:t>
             </a:r>
-            <a:endParaRPr lang="en-US" dirty="0" smtClean="0"/>
           </a:p>
           <a:p>
             <a:pPr marL="457200" indent="-457200">
@@ -5343,11 +5337,7 @@
             </a:pPr>
             <a:r>
               <a:rPr lang="ru-RU" dirty="0"/>
-              <a:t>Символы нельзя прочитать с помощью </a:t>
-            </a:r>
-            <a:r>
-              <a:rPr lang="ru-RU" dirty="0"/>
-              <a:t> </a:t>
+              <a:t>Символы нельзя прочитать с помощью  </a:t>
             </a:r>
             <a:r>
               <a:rPr lang="en-US" dirty="0" smtClean="0"/>
@@ -6098,9 +6088,9 @@
       </p:sp>
       <p:pic>
         <p:nvPicPr>
-          <p:cNvPr id="5" name="Рисунок 4"/>
+          <p:cNvPr id="2050" name="Picture 2" descr="C:\Users\Admin\Desktop\Screenshot_4.png"/>
           <p:cNvPicPr>
-            <a:picLocks noChangeAspect="1"/>
+            <a:picLocks noChangeAspect="1" noChangeArrowheads="1"/>
           </p:cNvPicPr>
           <p:nvPr/>
         </p:nvPicPr>
@@ -6112,23 +6102,34 @@
               </a:ext>
             </a:extLst>
           </a:blip>
+          <a:srcRect/>
           <a:stretch>
             <a:fillRect/>
           </a:stretch>
         </p:blipFill>
-        <p:spPr>
-          <a:xfrm>
-            <a:off x="8037320" y="4982497"/>
-            <a:ext cx="2367899" cy="341505"/>
+        <p:spPr bwMode="auto">
+          <a:xfrm>
+            <a:off x="986420" y="1652543"/>
+            <a:ext cx="3409950" cy="1847850"/>
           </a:xfrm>
           <a:prstGeom prst="rect">
             <a:avLst/>
           </a:prstGeom>
+          <a:noFill/>
+          <a:extLst>
+            <a:ext uri="{909E8E84-426E-40DD-AFC4-6F175D3DCCD1}">
+              <a14:hiddenFill xmlns:a14="http://schemas.microsoft.com/office/drawing/2010/main">
+                <a:solidFill>
+                  <a:srgbClr val="FFFFFF"/>
+                </a:solidFill>
+              </a14:hiddenFill>
+            </a:ext>
+          </a:extLst>
         </p:spPr>
       </p:pic>
       <p:pic>
         <p:nvPicPr>
-          <p:cNvPr id="2050" name="Picture 2" descr="C:\Users\Admin\Desktop\Screenshot_4.png"/>
+          <p:cNvPr id="2051" name="Picture 3" descr="C:\Users\Admin\Desktop\Screenshot_5.png"/>
           <p:cNvPicPr>
             <a:picLocks noChangeAspect="1" noChangeArrowheads="1"/>
           </p:cNvPicPr>
@@ -6149,8 +6150,8 @@
         </p:blipFill>
         <p:spPr bwMode="auto">
           <a:xfrm>
-            <a:off x="986420" y="1652543"/>
-            <a:ext cx="3409950" cy="1847850"/>
+            <a:off x="986420" y="3706633"/>
+            <a:ext cx="4963619" cy="1114425"/>
           </a:xfrm>
           <a:prstGeom prst="rect">
             <a:avLst/>
@@ -6169,7 +6170,7 @@
       </p:pic>
       <p:pic>
         <p:nvPicPr>
-          <p:cNvPr id="2051" name="Picture 3" descr="C:\Users\Admin\Desktop\Screenshot_5.png"/>
+          <p:cNvPr id="2052" name="Picture 4" descr="C:\Users\Admin\Desktop\Screenshot_6.png"/>
           <p:cNvPicPr>
             <a:picLocks noChangeAspect="1" noChangeArrowheads="1"/>
           </p:cNvPicPr>
@@ -6190,8 +6191,8 @@
         </p:blipFill>
         <p:spPr bwMode="auto">
           <a:xfrm>
-            <a:off x="986420" y="3706633"/>
-            <a:ext cx="4963619" cy="1114425"/>
+            <a:off x="6213338" y="1652543"/>
+            <a:ext cx="5566529" cy="3168515"/>
           </a:xfrm>
           <a:prstGeom prst="rect">
             <a:avLst/>
@@ -6210,7 +6211,7 @@
       </p:pic>
       <p:pic>
         <p:nvPicPr>
-          <p:cNvPr id="2052" name="Picture 4" descr="C:\Users\Admin\Desktop\Screenshot_6.png"/>
+          <p:cNvPr id="2053" name="Picture 5" descr="C:\Users\Admin\Desktop\Screenshot_7.png"/>
           <p:cNvPicPr>
             <a:picLocks noChangeAspect="1" noChangeArrowheads="1"/>
           </p:cNvPicPr>
@@ -6218,47 +6219,6 @@
         </p:nvPicPr>
         <p:blipFill>
           <a:blip r:embed="rId5">
-            <a:extLst>
-              <a:ext uri="{28A0092B-C50C-407E-A947-70E740481C1C}">
-                <a14:useLocalDpi xmlns:a14="http://schemas.microsoft.com/office/drawing/2010/main" val="0"/>
-              </a:ext>
-            </a:extLst>
-          </a:blip>
-          <a:srcRect/>
-          <a:stretch>
-            <a:fillRect/>
-          </a:stretch>
-        </p:blipFill>
-        <p:spPr bwMode="auto">
-          <a:xfrm>
-            <a:off x="6213338" y="1652543"/>
-            <a:ext cx="5566529" cy="3168515"/>
-          </a:xfrm>
-          <a:prstGeom prst="rect">
-            <a:avLst/>
-          </a:prstGeom>
-          <a:noFill/>
-          <a:extLst>
-            <a:ext uri="{909E8E84-426E-40DD-AFC4-6F175D3DCCD1}">
-              <a14:hiddenFill xmlns:a14="http://schemas.microsoft.com/office/drawing/2010/main">
-                <a:solidFill>
-                  <a:srgbClr val="FFFFFF"/>
-                </a:solidFill>
-              </a14:hiddenFill>
-            </a:ext>
-          </a:extLst>
-        </p:spPr>
-      </p:pic>
-      <p:pic>
-        <p:nvPicPr>
-          <p:cNvPr id="2053" name="Picture 5" descr="C:\Users\Admin\Desktop\Screenshot_7.png"/>
-          <p:cNvPicPr>
-            <a:picLocks noChangeAspect="1" noChangeArrowheads="1"/>
-          </p:cNvPicPr>
-          <p:nvPr/>
-        </p:nvPicPr>
-        <p:blipFill>
-          <a:blip r:embed="rId6">
             <a:extLst>
               <a:ext uri="{28A0092B-C50C-407E-A947-70E740481C1C}">
                 <a14:useLocalDpi xmlns:a14="http://schemas.microsoft.com/office/drawing/2010/main" val="0"/>

</xml_diff>